<commit_message>
first commit in a while, lots of updates
</commit_message>
<xml_diff>
--- a/u_mddft_paper/aimd4/pics.pptx
+++ b/u_mddft_paper/aimd4/pics.pptx
@@ -267,7 +267,7 @@
           <a:p>
             <a:fld id="{581BEB5D-54B5-A443-AD8C-1DAFF4CDC2D2}" type="datetimeFigureOut">
               <a:rPr lang="en-US" smtClean="0"/>
-              <a:t>6/22/20</a:t>
+              <a:t>6/30/20</a:t>
             </a:fld>
             <a:endParaRPr lang="en-US"/>
           </a:p>
@@ -465,7 +465,7 @@
           <a:p>
             <a:fld id="{581BEB5D-54B5-A443-AD8C-1DAFF4CDC2D2}" type="datetimeFigureOut">
               <a:rPr lang="en-US" smtClean="0"/>
-              <a:t>6/22/20</a:t>
+              <a:t>6/30/20</a:t>
             </a:fld>
             <a:endParaRPr lang="en-US"/>
           </a:p>
@@ -673,7 +673,7 @@
           <a:p>
             <a:fld id="{581BEB5D-54B5-A443-AD8C-1DAFF4CDC2D2}" type="datetimeFigureOut">
               <a:rPr lang="en-US" smtClean="0"/>
-              <a:t>6/22/20</a:t>
+              <a:t>6/30/20</a:t>
             </a:fld>
             <a:endParaRPr lang="en-US"/>
           </a:p>
@@ -871,7 +871,7 @@
           <a:p>
             <a:fld id="{581BEB5D-54B5-A443-AD8C-1DAFF4CDC2D2}" type="datetimeFigureOut">
               <a:rPr lang="en-US" smtClean="0"/>
-              <a:t>6/22/20</a:t>
+              <a:t>6/30/20</a:t>
             </a:fld>
             <a:endParaRPr lang="en-US"/>
           </a:p>
@@ -1146,7 +1146,7 @@
           <a:p>
             <a:fld id="{581BEB5D-54B5-A443-AD8C-1DAFF4CDC2D2}" type="datetimeFigureOut">
               <a:rPr lang="en-US" smtClean="0"/>
-              <a:t>6/22/20</a:t>
+              <a:t>6/30/20</a:t>
             </a:fld>
             <a:endParaRPr lang="en-US"/>
           </a:p>
@@ -1411,7 +1411,7 @@
           <a:p>
             <a:fld id="{581BEB5D-54B5-A443-AD8C-1DAFF4CDC2D2}" type="datetimeFigureOut">
               <a:rPr lang="en-US" smtClean="0"/>
-              <a:t>6/22/20</a:t>
+              <a:t>6/30/20</a:t>
             </a:fld>
             <a:endParaRPr lang="en-US"/>
           </a:p>
@@ -1823,7 +1823,7 @@
           <a:p>
             <a:fld id="{581BEB5D-54B5-A443-AD8C-1DAFF4CDC2D2}" type="datetimeFigureOut">
               <a:rPr lang="en-US" smtClean="0"/>
-              <a:t>6/22/20</a:t>
+              <a:t>6/30/20</a:t>
             </a:fld>
             <a:endParaRPr lang="en-US"/>
           </a:p>
@@ -1964,7 +1964,7 @@
           <a:p>
             <a:fld id="{581BEB5D-54B5-A443-AD8C-1DAFF4CDC2D2}" type="datetimeFigureOut">
               <a:rPr lang="en-US" smtClean="0"/>
-              <a:t>6/22/20</a:t>
+              <a:t>6/30/20</a:t>
             </a:fld>
             <a:endParaRPr lang="en-US"/>
           </a:p>
@@ -2077,7 +2077,7 @@
           <a:p>
             <a:fld id="{581BEB5D-54B5-A443-AD8C-1DAFF4CDC2D2}" type="datetimeFigureOut">
               <a:rPr lang="en-US" smtClean="0"/>
-              <a:t>6/22/20</a:t>
+              <a:t>6/30/20</a:t>
             </a:fld>
             <a:endParaRPr lang="en-US"/>
           </a:p>
@@ -2388,7 +2388,7 @@
           <a:p>
             <a:fld id="{581BEB5D-54B5-A443-AD8C-1DAFF4CDC2D2}" type="datetimeFigureOut">
               <a:rPr lang="en-US" smtClean="0"/>
-              <a:t>6/22/20</a:t>
+              <a:t>6/30/20</a:t>
             </a:fld>
             <a:endParaRPr lang="en-US"/>
           </a:p>
@@ -2676,7 +2676,7 @@
           <a:p>
             <a:fld id="{581BEB5D-54B5-A443-AD8C-1DAFF4CDC2D2}" type="datetimeFigureOut">
               <a:rPr lang="en-US" smtClean="0"/>
-              <a:t>6/22/20</a:t>
+              <a:t>6/30/20</a:t>
             </a:fld>
             <a:endParaRPr lang="en-US"/>
           </a:p>
@@ -2917,7 +2917,7 @@
           <a:p>
             <a:fld id="{581BEB5D-54B5-A443-AD8C-1DAFF4CDC2D2}" type="datetimeFigureOut">
               <a:rPr lang="en-US" smtClean="0"/>
-              <a:t>6/22/20</a:t>
+              <a:t>6/30/20</a:t>
             </a:fld>
             <a:endParaRPr lang="en-US"/>
           </a:p>
@@ -3886,10 +3886,10 @@
       </p:grpSpPr>
       <p:pic>
         <p:nvPicPr>
-          <p:cNvPr id="4" name="Picture 3">
-            <a:extLst>
-              <a:ext uri="{FF2B5EF4-FFF2-40B4-BE49-F238E27FC236}">
-                <a16:creationId xmlns:a16="http://schemas.microsoft.com/office/drawing/2014/main" id="{BA97EEAE-3683-A94F-8560-0B29384C78CC}"/>
+          <p:cNvPr id="2" name="Picture 1">
+            <a:extLst>
+              <a:ext uri="{FF2B5EF4-FFF2-40B4-BE49-F238E27FC236}">
+                <a16:creationId xmlns:a16="http://schemas.microsoft.com/office/drawing/2014/main" id="{6E20001B-9F12-8E4E-9CFC-EA9E1798D4A6}"/>
               </a:ext>
             </a:extLst>
           </p:cNvPr>
@@ -3906,8 +3906,8 @@
         </p:blipFill>
         <p:spPr>
           <a:xfrm>
-            <a:off x="2814320" y="962660"/>
-            <a:ext cx="6553200" cy="4914900"/>
+            <a:off x="2824480" y="1056640"/>
+            <a:ext cx="6400800" cy="4800600"/>
           </a:xfrm>
           <a:prstGeom prst="rect">
             <a:avLst/>

</xml_diff>